<commit_message>
Terminados apartados '¿Que es Integromat Make?' y 'Como utilizar Integromat Make'
</commit_message>
<xml_diff>
--- a/Practicas/Practica 2 - Integromat Make/Herramienta Integromat Make - Juan Alberto Domínguez Vázquez Saúl Rodríguez Naranjo.pptx
+++ b/Practicas/Practica 2 - Integromat Make/Herramienta Integromat Make - Juan Alberto Domínguez Vázquez Saúl Rodríguez Naranjo.pptx
@@ -5,17 +5,25 @@
     <p:sldMasterId id="2147483672" r:id="rId1"/>
   </p:sldMasterIdLst>
   <p:notesMasterIdLst>
-    <p:notesMasterId r:id="rId7"/>
+    <p:notesMasterId r:id="rId15"/>
   </p:notesMasterIdLst>
   <p:handoutMasterIdLst>
-    <p:handoutMasterId r:id="rId8"/>
+    <p:handoutMasterId r:id="rId16"/>
   </p:handoutMasterIdLst>
   <p:sldIdLst>
     <p:sldId id="256" r:id="rId2"/>
     <p:sldId id="262" r:id="rId3"/>
     <p:sldId id="265" r:id="rId4"/>
-    <p:sldId id="266" r:id="rId5"/>
-    <p:sldId id="267" r:id="rId6"/>
+    <p:sldId id="270" r:id="rId5"/>
+    <p:sldId id="268" r:id="rId6"/>
+    <p:sldId id="272" r:id="rId7"/>
+    <p:sldId id="273" r:id="rId8"/>
+    <p:sldId id="269" r:id="rId9"/>
+    <p:sldId id="274" r:id="rId10"/>
+    <p:sldId id="271" r:id="rId11"/>
+    <p:sldId id="277" r:id="rId12"/>
+    <p:sldId id="275" r:id="rId13"/>
+    <p:sldId id="276" r:id="rId14"/>
   </p:sldIdLst>
   <p:sldSz cx="12192000" cy="6858000"/>
   <p:notesSz cx="6858000" cy="9144000"/>
@@ -7855,6 +7863,830 @@
 </p:sld>
 </file>
 
+<file path=ppt/slides/slide10.xml><?xml version="1.0" encoding="utf-8"?>
+<p:sld xmlns:a="http://schemas.openxmlformats.org/drawingml/2006/main" xmlns:r="http://schemas.openxmlformats.org/officeDocument/2006/relationships" xmlns:p="http://schemas.openxmlformats.org/presentationml/2006/main">
+  <p:cSld>
+    <p:spTree>
+      <p:nvGrpSpPr>
+        <p:cNvPr id="1" name=""/>
+        <p:cNvGrpSpPr/>
+        <p:nvPr/>
+      </p:nvGrpSpPr>
+      <p:grpSpPr>
+        <a:xfrm>
+          <a:off x="0" y="0"/>
+          <a:ext cx="0" cy="0"/>
+          <a:chOff x="0" y="0"/>
+          <a:chExt cx="0" cy="0"/>
+        </a:xfrm>
+      </p:grpSpPr>
+      <p:sp>
+        <p:nvSpPr>
+          <p:cNvPr id="2" name="Título 1">
+            <a:extLst>
+              <a:ext uri="{FF2B5EF4-FFF2-40B4-BE49-F238E27FC236}">
+                <a16:creationId xmlns:a16="http://schemas.microsoft.com/office/drawing/2014/main" id="{6E277C1B-E97D-6DF5-4801-A28E2795217D}"/>
+              </a:ext>
+            </a:extLst>
+          </p:cNvPr>
+          <p:cNvSpPr>
+            <a:spLocks noGrp="1"/>
+          </p:cNvSpPr>
+          <p:nvPr>
+            <p:ph type="title"/>
+          </p:nvPr>
+        </p:nvSpPr>
+        <p:spPr/>
+        <p:txBody>
+          <a:bodyPr/>
+          <a:lstStyle/>
+          <a:p>
+            <a:endParaRPr lang="es-ES"/>
+          </a:p>
+        </p:txBody>
+      </p:sp>
+      <p:sp>
+        <p:nvSpPr>
+          <p:cNvPr id="3" name="Marcador de contenido 2">
+            <a:extLst>
+              <a:ext uri="{FF2B5EF4-FFF2-40B4-BE49-F238E27FC236}">
+                <a16:creationId xmlns:a16="http://schemas.microsoft.com/office/drawing/2014/main" id="{D7FF1348-850A-C268-C144-D29AC444BECE}"/>
+              </a:ext>
+            </a:extLst>
+          </p:cNvPr>
+          <p:cNvSpPr>
+            <a:spLocks noGrp="1"/>
+          </p:cNvSpPr>
+          <p:nvPr>
+            <p:ph idx="1"/>
+          </p:nvPr>
+        </p:nvSpPr>
+        <p:spPr>
+          <a:xfrm>
+            <a:off x="581192" y="1894114"/>
+            <a:ext cx="11029615" cy="3964685"/>
+          </a:xfrm>
+        </p:spPr>
+        <p:txBody>
+          <a:bodyPr/>
+          <a:lstStyle/>
+          <a:p>
+            <a:r>
+              <a:rPr lang="es-ES" dirty="0"/>
+              <a:t>Primero accederemos a </a:t>
+            </a:r>
+            <a:r>
+              <a:rPr lang="es-ES" dirty="0" err="1"/>
+              <a:t>Discord</a:t>
+            </a:r>
+            <a:r>
+              <a:rPr lang="es-ES" dirty="0"/>
+              <a:t> </a:t>
+            </a:r>
+            <a:r>
+              <a:rPr lang="es-ES" dirty="0" err="1"/>
+              <a:t>Developer</a:t>
+            </a:r>
+            <a:r>
+              <a:rPr lang="es-ES" dirty="0"/>
+              <a:t>: </a:t>
+            </a:r>
+            <a:r>
+              <a:rPr lang="es-ES" b="0" i="0" dirty="0">
+                <a:effectLst/>
+                <a:latin typeface="inherit"/>
+                <a:hlinkClick r:id="rId2" tooltip="https://discord.com/login?redirect_to=%2Fdevelopers%2Fapplications"/>
+              </a:rPr>
+              <a:t>https://discord.com/login?redirect_to=%2Fdevelopers%2Fapplications</a:t>
+            </a:r>
+            <a:r>
+              <a:rPr lang="es-ES" b="0" i="0" dirty="0">
+                <a:effectLst/>
+                <a:latin typeface="inherit"/>
+              </a:rPr>
+              <a:t> y crearemos una “</a:t>
+            </a:r>
+            <a:r>
+              <a:rPr lang="es-ES" b="0" i="0" dirty="0" err="1">
+                <a:effectLst/>
+                <a:latin typeface="inherit"/>
+              </a:rPr>
+              <a:t>Application</a:t>
+            </a:r>
+            <a:r>
+              <a:rPr lang="es-ES" b="0" i="0" dirty="0">
+                <a:effectLst/>
+                <a:latin typeface="inherit"/>
+              </a:rPr>
+              <a:t>”.</a:t>
+            </a:r>
+          </a:p>
+          <a:p>
+            <a:endParaRPr lang="es-ES" b="0" i="0" dirty="0">
+              <a:effectLst/>
+              <a:latin typeface="inherit"/>
+            </a:endParaRPr>
+          </a:p>
+          <a:p>
+            <a:endParaRPr lang="es-ES" dirty="0">
+              <a:latin typeface="inherit"/>
+            </a:endParaRPr>
+          </a:p>
+          <a:p>
+            <a:endParaRPr lang="es-ES" b="0" i="0" dirty="0">
+              <a:effectLst/>
+              <a:latin typeface="inherit"/>
+            </a:endParaRPr>
+          </a:p>
+          <a:p>
+            <a:endParaRPr lang="es-ES" dirty="0">
+              <a:latin typeface="inherit"/>
+            </a:endParaRPr>
+          </a:p>
+          <a:p>
+            <a:endParaRPr lang="es-ES" b="0" i="0" dirty="0">
+              <a:effectLst/>
+              <a:latin typeface="inherit"/>
+            </a:endParaRPr>
+          </a:p>
+          <a:p>
+            <a:endParaRPr lang="es-ES" dirty="0">
+              <a:latin typeface="inherit"/>
+            </a:endParaRPr>
+          </a:p>
+          <a:p>
+            <a:endParaRPr lang="es-ES" b="0" i="0" dirty="0">
+              <a:effectLst/>
+              <a:latin typeface="inherit"/>
+            </a:endParaRPr>
+          </a:p>
+          <a:p>
+            <a:r>
+              <a:rPr lang="es-ES" dirty="0">
+                <a:latin typeface="inherit"/>
+              </a:rPr>
+              <a:t>Esta </a:t>
+            </a:r>
+            <a:r>
+              <a:rPr lang="es-ES" dirty="0" err="1">
+                <a:latin typeface="inherit"/>
+              </a:rPr>
+              <a:t>Application</a:t>
+            </a:r>
+            <a:r>
+              <a:rPr lang="es-ES" dirty="0">
+                <a:latin typeface="inherit"/>
+              </a:rPr>
+              <a:t> será la utilizada en la conexión con </a:t>
+            </a:r>
+            <a:r>
+              <a:rPr lang="es-ES" dirty="0" err="1">
+                <a:latin typeface="inherit"/>
+              </a:rPr>
+              <a:t>Integromat</a:t>
+            </a:r>
+            <a:r>
+              <a:rPr lang="es-ES" dirty="0">
+                <a:latin typeface="inherit"/>
+              </a:rPr>
+              <a:t> </a:t>
+            </a:r>
+            <a:r>
+              <a:rPr lang="es-ES" dirty="0" err="1">
+                <a:latin typeface="inherit"/>
+              </a:rPr>
+              <a:t>Make</a:t>
+            </a:r>
+            <a:r>
+              <a:rPr lang="es-ES" dirty="0">
+                <a:latin typeface="inherit"/>
+              </a:rPr>
+              <a:t>.</a:t>
+            </a:r>
+            <a:endParaRPr lang="es-ES" dirty="0"/>
+          </a:p>
+        </p:txBody>
+      </p:sp>
+      <p:pic>
+        <p:nvPicPr>
+          <p:cNvPr id="5" name="Imagen 4">
+            <a:extLst>
+              <a:ext uri="{FF2B5EF4-FFF2-40B4-BE49-F238E27FC236}">
+                <a16:creationId xmlns:a16="http://schemas.microsoft.com/office/drawing/2014/main" id="{502F6733-E91D-6137-08CB-5E0C44157299}"/>
+              </a:ext>
+            </a:extLst>
+          </p:cNvPr>
+          <p:cNvPicPr>
+            <a:picLocks noChangeAspect="1"/>
+          </p:cNvPicPr>
+          <p:nvPr/>
+        </p:nvPicPr>
+        <p:blipFill>
+          <a:blip r:embed="rId3"/>
+          <a:stretch>
+            <a:fillRect/>
+          </a:stretch>
+        </p:blipFill>
+        <p:spPr>
+          <a:xfrm>
+            <a:off x="1505338" y="2660391"/>
+            <a:ext cx="9181322" cy="2582247"/>
+          </a:xfrm>
+          <a:prstGeom prst="rect">
+            <a:avLst/>
+          </a:prstGeom>
+        </p:spPr>
+      </p:pic>
+    </p:spTree>
+    <p:extLst>
+      <p:ext uri="{BB962C8B-B14F-4D97-AF65-F5344CB8AC3E}">
+        <p14:creationId xmlns:p14="http://schemas.microsoft.com/office/powerpoint/2010/main" val="1347919039"/>
+      </p:ext>
+    </p:extLst>
+  </p:cSld>
+  <p:clrMapOvr>
+    <a:masterClrMapping/>
+  </p:clrMapOvr>
+</p:sld>
+</file>
+
+<file path=ppt/slides/slide11.xml><?xml version="1.0" encoding="utf-8"?>
+<p:sld xmlns:a="http://schemas.openxmlformats.org/drawingml/2006/main" xmlns:r="http://schemas.openxmlformats.org/officeDocument/2006/relationships" xmlns:p="http://schemas.openxmlformats.org/presentationml/2006/main">
+  <p:cSld>
+    <p:spTree>
+      <p:nvGrpSpPr>
+        <p:cNvPr id="1" name=""/>
+        <p:cNvGrpSpPr/>
+        <p:nvPr/>
+      </p:nvGrpSpPr>
+      <p:grpSpPr>
+        <a:xfrm>
+          <a:off x="0" y="0"/>
+          <a:ext cx="0" cy="0"/>
+          <a:chOff x="0" y="0"/>
+          <a:chExt cx="0" cy="0"/>
+        </a:xfrm>
+      </p:grpSpPr>
+      <p:sp>
+        <p:nvSpPr>
+          <p:cNvPr id="2" name="Título 1">
+            <a:extLst>
+              <a:ext uri="{FF2B5EF4-FFF2-40B4-BE49-F238E27FC236}">
+                <a16:creationId xmlns:a16="http://schemas.microsoft.com/office/drawing/2014/main" id="{6E277C1B-E97D-6DF5-4801-A28E2795217D}"/>
+              </a:ext>
+            </a:extLst>
+          </p:cNvPr>
+          <p:cNvSpPr>
+            <a:spLocks noGrp="1"/>
+          </p:cNvSpPr>
+          <p:nvPr>
+            <p:ph type="title"/>
+          </p:nvPr>
+        </p:nvSpPr>
+        <p:spPr/>
+        <p:txBody>
+          <a:bodyPr/>
+          <a:lstStyle/>
+          <a:p>
+            <a:endParaRPr lang="es-ES"/>
+          </a:p>
+        </p:txBody>
+      </p:sp>
+      <p:sp>
+        <p:nvSpPr>
+          <p:cNvPr id="3" name="Marcador de contenido 2">
+            <a:extLst>
+              <a:ext uri="{FF2B5EF4-FFF2-40B4-BE49-F238E27FC236}">
+                <a16:creationId xmlns:a16="http://schemas.microsoft.com/office/drawing/2014/main" id="{D7FF1348-850A-C268-C144-D29AC444BECE}"/>
+              </a:ext>
+            </a:extLst>
+          </p:cNvPr>
+          <p:cNvSpPr>
+            <a:spLocks noGrp="1"/>
+          </p:cNvSpPr>
+          <p:nvPr>
+            <p:ph idx="1"/>
+          </p:nvPr>
+        </p:nvSpPr>
+        <p:spPr>
+          <a:xfrm>
+            <a:off x="581192" y="1894114"/>
+            <a:ext cx="11029615" cy="3964685"/>
+          </a:xfrm>
+        </p:spPr>
+        <p:txBody>
+          <a:bodyPr/>
+          <a:lstStyle/>
+          <a:p>
+            <a:r>
+              <a:rPr lang="es-ES" dirty="0"/>
+              <a:t>Configuraremos la </a:t>
+            </a:r>
+            <a:r>
+              <a:rPr lang="es-ES" dirty="0" err="1"/>
+              <a:t>Application</a:t>
+            </a:r>
+            <a:r>
+              <a:rPr lang="es-ES" dirty="0"/>
+              <a:t> con los </a:t>
+            </a:r>
+            <a:r>
+              <a:rPr lang="es-ES" dirty="0" err="1"/>
+              <a:t>redirects</a:t>
+            </a:r>
+            <a:r>
+              <a:rPr lang="es-ES" dirty="0"/>
+              <a:t> hacia </a:t>
+            </a:r>
+            <a:r>
+              <a:rPr lang="es-ES" dirty="0" err="1"/>
+              <a:t>Integromat</a:t>
+            </a:r>
+            <a:r>
+              <a:rPr lang="es-ES" dirty="0"/>
+              <a:t> para su conexión, y anotaremos los parámetros Client ID y Client </a:t>
+            </a:r>
+            <a:r>
+              <a:rPr lang="es-ES" dirty="0" err="1"/>
+              <a:t>Secret</a:t>
+            </a:r>
+            <a:r>
+              <a:rPr lang="es-ES" dirty="0"/>
+              <a:t> para su posterior uso.</a:t>
+            </a:r>
+            <a:endParaRPr lang="es-ES" b="0" i="0" dirty="0">
+              <a:effectLst/>
+              <a:latin typeface="inherit"/>
+            </a:endParaRPr>
+          </a:p>
+          <a:p>
+            <a:endParaRPr lang="es-ES" b="0" i="0" dirty="0">
+              <a:effectLst/>
+              <a:latin typeface="inherit"/>
+            </a:endParaRPr>
+          </a:p>
+          <a:p>
+            <a:endParaRPr lang="es-ES" dirty="0">
+              <a:latin typeface="inherit"/>
+            </a:endParaRPr>
+          </a:p>
+          <a:p>
+            <a:endParaRPr lang="es-ES" b="0" i="0" dirty="0">
+              <a:effectLst/>
+              <a:latin typeface="inherit"/>
+            </a:endParaRPr>
+          </a:p>
+          <a:p>
+            <a:endParaRPr lang="es-ES" dirty="0">
+              <a:latin typeface="inherit"/>
+            </a:endParaRPr>
+          </a:p>
+          <a:p>
+            <a:endParaRPr lang="es-ES" b="0" i="0" dirty="0">
+              <a:effectLst/>
+              <a:latin typeface="inherit"/>
+            </a:endParaRPr>
+          </a:p>
+          <a:p>
+            <a:endParaRPr lang="es-ES" dirty="0">
+              <a:latin typeface="inherit"/>
+            </a:endParaRPr>
+          </a:p>
+          <a:p>
+            <a:endParaRPr lang="es-ES" b="0" i="0" dirty="0">
+              <a:effectLst/>
+              <a:latin typeface="inherit"/>
+            </a:endParaRPr>
+          </a:p>
+        </p:txBody>
+      </p:sp>
+      <p:pic>
+        <p:nvPicPr>
+          <p:cNvPr id="6" name="Imagen 5">
+            <a:extLst>
+              <a:ext uri="{FF2B5EF4-FFF2-40B4-BE49-F238E27FC236}">
+                <a16:creationId xmlns:a16="http://schemas.microsoft.com/office/drawing/2014/main" id="{B678ABA6-6863-3234-3205-3051C04A791E}"/>
+              </a:ext>
+            </a:extLst>
+          </p:cNvPr>
+          <p:cNvPicPr>
+            <a:picLocks noChangeAspect="1"/>
+          </p:cNvPicPr>
+          <p:nvPr/>
+        </p:nvPicPr>
+        <p:blipFill>
+          <a:blip r:embed="rId2"/>
+          <a:stretch>
+            <a:fillRect/>
+          </a:stretch>
+        </p:blipFill>
+        <p:spPr>
+          <a:xfrm>
+            <a:off x="1150775" y="2956575"/>
+            <a:ext cx="9890450" cy="3403857"/>
+          </a:xfrm>
+          <a:prstGeom prst="rect">
+            <a:avLst/>
+          </a:prstGeom>
+        </p:spPr>
+      </p:pic>
+    </p:spTree>
+    <p:extLst>
+      <p:ext uri="{BB962C8B-B14F-4D97-AF65-F5344CB8AC3E}">
+        <p14:creationId xmlns:p14="http://schemas.microsoft.com/office/powerpoint/2010/main" val="2447900090"/>
+      </p:ext>
+    </p:extLst>
+  </p:cSld>
+  <p:clrMapOvr>
+    <a:masterClrMapping/>
+  </p:clrMapOvr>
+</p:sld>
+</file>
+
+<file path=ppt/slides/slide12.xml><?xml version="1.0" encoding="utf-8"?>
+<p:sld xmlns:a="http://schemas.openxmlformats.org/drawingml/2006/main" xmlns:r="http://schemas.openxmlformats.org/officeDocument/2006/relationships" xmlns:p="http://schemas.openxmlformats.org/presentationml/2006/main">
+  <p:cSld>
+    <p:spTree>
+      <p:nvGrpSpPr>
+        <p:cNvPr id="1" name=""/>
+        <p:cNvGrpSpPr/>
+        <p:nvPr/>
+      </p:nvGrpSpPr>
+      <p:grpSpPr>
+        <a:xfrm>
+          <a:off x="0" y="0"/>
+          <a:ext cx="0" cy="0"/>
+          <a:chOff x="0" y="0"/>
+          <a:chExt cx="0" cy="0"/>
+        </a:xfrm>
+      </p:grpSpPr>
+      <p:sp>
+        <p:nvSpPr>
+          <p:cNvPr id="2" name="Título 1">
+            <a:extLst>
+              <a:ext uri="{FF2B5EF4-FFF2-40B4-BE49-F238E27FC236}">
+                <a16:creationId xmlns:a16="http://schemas.microsoft.com/office/drawing/2014/main" id="{522F770A-B751-A57F-19C1-0443BF0B96BC}"/>
+              </a:ext>
+            </a:extLst>
+          </p:cNvPr>
+          <p:cNvSpPr>
+            <a:spLocks noGrp="1"/>
+          </p:cNvSpPr>
+          <p:nvPr>
+            <p:ph type="title"/>
+          </p:nvPr>
+        </p:nvSpPr>
+        <p:spPr/>
+        <p:txBody>
+          <a:bodyPr/>
+          <a:lstStyle/>
+          <a:p>
+            <a:r>
+              <a:rPr lang="es-ES" dirty="0"/>
+              <a:t>Ejemplo Práctico: </a:t>
+            </a:r>
+            <a:r>
+              <a:rPr lang="es-ES" dirty="0" err="1"/>
+              <a:t>discord</a:t>
+            </a:r>
+            <a:r>
+              <a:rPr lang="es-ES" dirty="0"/>
+              <a:t> y Google </a:t>
+            </a:r>
+            <a:r>
+              <a:rPr lang="es-ES" dirty="0" err="1"/>
+              <a:t>sheets</a:t>
+            </a:r>
+            <a:endParaRPr lang="es-ES" dirty="0"/>
+          </a:p>
+        </p:txBody>
+      </p:sp>
+      <p:sp>
+        <p:nvSpPr>
+          <p:cNvPr id="3" name="Marcador de contenido 2">
+            <a:extLst>
+              <a:ext uri="{FF2B5EF4-FFF2-40B4-BE49-F238E27FC236}">
+                <a16:creationId xmlns:a16="http://schemas.microsoft.com/office/drawing/2014/main" id="{824DE2AA-5EEA-0ABA-D574-570AAFF433EA}"/>
+              </a:ext>
+            </a:extLst>
+          </p:cNvPr>
+          <p:cNvSpPr>
+            <a:spLocks noGrp="1"/>
+          </p:cNvSpPr>
+          <p:nvPr>
+            <p:ph sz="half" idx="1"/>
+          </p:nvPr>
+        </p:nvSpPr>
+        <p:spPr/>
+        <p:txBody>
+          <a:bodyPr/>
+          <a:lstStyle/>
+          <a:p>
+            <a:pPr algn="just"/>
+            <a:r>
+              <a:rPr lang="es-ES" dirty="0"/>
+              <a:t>Veamos primero la configuración del módulo de </a:t>
+            </a:r>
+            <a:r>
+              <a:rPr lang="es-ES" dirty="0" err="1"/>
+              <a:t>Discord</a:t>
+            </a:r>
+            <a:r>
+              <a:rPr lang="es-ES" dirty="0"/>
+              <a:t>:</a:t>
+            </a:r>
+          </a:p>
+          <a:p>
+            <a:pPr algn="just"/>
+            <a:r>
+              <a:rPr lang="es-ES" dirty="0"/>
+              <a:t>Para la creación de la conexión es necesario crear previamente una aplicación mediante la funcionalidad </a:t>
+            </a:r>
+            <a:r>
+              <a:rPr lang="es-ES" dirty="0" err="1"/>
+              <a:t>Discord</a:t>
+            </a:r>
+            <a:r>
+              <a:rPr lang="es-ES" dirty="0"/>
+              <a:t> </a:t>
+            </a:r>
+            <a:r>
+              <a:rPr lang="es-ES" dirty="0" err="1"/>
+              <a:t>Developer</a:t>
+            </a:r>
+            <a:r>
+              <a:rPr lang="es-ES" dirty="0"/>
+              <a:t> y seguir los pasos para generar un Client ID, un Client </a:t>
+            </a:r>
+            <a:r>
+              <a:rPr lang="es-ES" dirty="0" err="1"/>
+              <a:t>Secret</a:t>
+            </a:r>
+            <a:r>
+              <a:rPr lang="es-ES" dirty="0"/>
+              <a:t> y un Bot token.</a:t>
+            </a:r>
+          </a:p>
+        </p:txBody>
+      </p:sp>
+      <p:pic>
+        <p:nvPicPr>
+          <p:cNvPr id="6" name="Marcador de contenido 5" descr="Interfaz de usuario gráfica, Texto, Aplicación&#10;&#10;Descripción generada automáticamente">
+            <a:extLst>
+              <a:ext uri="{FF2B5EF4-FFF2-40B4-BE49-F238E27FC236}">
+                <a16:creationId xmlns:a16="http://schemas.microsoft.com/office/drawing/2014/main" id="{4FBCFF0A-776E-9344-9710-59942C217FF2}"/>
+              </a:ext>
+            </a:extLst>
+          </p:cNvPr>
+          <p:cNvPicPr>
+            <a:picLocks noGrp="1" noChangeAspect="1"/>
+          </p:cNvPicPr>
+          <p:nvPr>
+            <p:ph sz="half" idx="2"/>
+          </p:nvPr>
+        </p:nvPicPr>
+        <p:blipFill>
+          <a:blip r:embed="rId2"/>
+          <a:stretch>
+            <a:fillRect/>
+          </a:stretch>
+        </p:blipFill>
+        <p:spPr>
+          <a:xfrm>
+            <a:off x="7640794" y="1869950"/>
+            <a:ext cx="2396167" cy="4988050"/>
+          </a:xfrm>
+        </p:spPr>
+      </p:pic>
+    </p:spTree>
+    <p:extLst>
+      <p:ext uri="{BB962C8B-B14F-4D97-AF65-F5344CB8AC3E}">
+        <p14:creationId xmlns:p14="http://schemas.microsoft.com/office/powerpoint/2010/main" val="2567135678"/>
+      </p:ext>
+    </p:extLst>
+  </p:cSld>
+  <p:clrMapOvr>
+    <a:masterClrMapping/>
+  </p:clrMapOvr>
+</p:sld>
+</file>
+
+<file path=ppt/slides/slide13.xml><?xml version="1.0" encoding="utf-8"?>
+<p:sld xmlns:a="http://schemas.openxmlformats.org/drawingml/2006/main" xmlns:r="http://schemas.openxmlformats.org/officeDocument/2006/relationships" xmlns:p="http://schemas.openxmlformats.org/presentationml/2006/main">
+  <p:cSld>
+    <p:spTree>
+      <p:nvGrpSpPr>
+        <p:cNvPr id="1" name=""/>
+        <p:cNvGrpSpPr/>
+        <p:nvPr/>
+      </p:nvGrpSpPr>
+      <p:grpSpPr>
+        <a:xfrm>
+          <a:off x="0" y="0"/>
+          <a:ext cx="0" cy="0"/>
+          <a:chOff x="0" y="0"/>
+          <a:chExt cx="0" cy="0"/>
+        </a:xfrm>
+      </p:grpSpPr>
+      <p:sp>
+        <p:nvSpPr>
+          <p:cNvPr id="2" name="Título 1">
+            <a:extLst>
+              <a:ext uri="{FF2B5EF4-FFF2-40B4-BE49-F238E27FC236}">
+                <a16:creationId xmlns:a16="http://schemas.microsoft.com/office/drawing/2014/main" id="{7E7A30FF-DD38-6A93-5CBF-1E7CD7C0948F}"/>
+              </a:ext>
+            </a:extLst>
+          </p:cNvPr>
+          <p:cNvSpPr>
+            <a:spLocks noGrp="1"/>
+          </p:cNvSpPr>
+          <p:nvPr>
+            <p:ph type="title"/>
+          </p:nvPr>
+        </p:nvSpPr>
+        <p:spPr/>
+        <p:txBody>
+          <a:bodyPr/>
+          <a:lstStyle/>
+          <a:p>
+            <a:r>
+              <a:rPr lang="es-ES" dirty="0"/>
+              <a:t>Ejemplo Práctico: </a:t>
+            </a:r>
+            <a:r>
+              <a:rPr lang="es-ES" dirty="0" err="1"/>
+              <a:t>discord</a:t>
+            </a:r>
+            <a:r>
+              <a:rPr lang="es-ES" dirty="0"/>
+              <a:t> y Google </a:t>
+            </a:r>
+            <a:r>
+              <a:rPr lang="es-ES" dirty="0" err="1"/>
+              <a:t>sheets</a:t>
+            </a:r>
+            <a:endParaRPr lang="es-ES" dirty="0"/>
+          </a:p>
+        </p:txBody>
+      </p:sp>
+      <p:pic>
+        <p:nvPicPr>
+          <p:cNvPr id="6" name="Marcador de contenido 5" descr="Interfaz de usuario gráfica, Aplicación&#10;&#10;Descripción generada automáticamente">
+            <a:extLst>
+              <a:ext uri="{FF2B5EF4-FFF2-40B4-BE49-F238E27FC236}">
+                <a16:creationId xmlns:a16="http://schemas.microsoft.com/office/drawing/2014/main" id="{02B3615C-B2A7-776B-2F71-A08254B93D17}"/>
+              </a:ext>
+            </a:extLst>
+          </p:cNvPr>
+          <p:cNvPicPr>
+            <a:picLocks noGrp="1" noChangeAspect="1"/>
+          </p:cNvPicPr>
+          <p:nvPr>
+            <p:ph sz="half" idx="1"/>
+          </p:nvPr>
+        </p:nvPicPr>
+        <p:blipFill>
+          <a:blip r:embed="rId2"/>
+          <a:stretch>
+            <a:fillRect/>
+          </a:stretch>
+        </p:blipFill>
+        <p:spPr>
+          <a:xfrm>
+            <a:off x="3660593" y="2394857"/>
+            <a:ext cx="1762308" cy="3633787"/>
+          </a:xfrm>
+        </p:spPr>
+      </p:pic>
+      <p:pic>
+        <p:nvPicPr>
+          <p:cNvPr id="8" name="Marcador de contenido 7" descr="Interfaz de usuario gráfica, Aplicación, Tabla, Excel&#10;&#10;Descripción generada automáticamente">
+            <a:extLst>
+              <a:ext uri="{FF2B5EF4-FFF2-40B4-BE49-F238E27FC236}">
+                <a16:creationId xmlns:a16="http://schemas.microsoft.com/office/drawing/2014/main" id="{FC7A36B2-1956-9B26-79BE-C9019ABC1095}"/>
+              </a:ext>
+            </a:extLst>
+          </p:cNvPr>
+          <p:cNvPicPr>
+            <a:picLocks noGrp="1" noChangeAspect="1"/>
+          </p:cNvPicPr>
+          <p:nvPr>
+            <p:ph sz="half" idx="2"/>
+          </p:nvPr>
+        </p:nvPicPr>
+        <p:blipFill>
+          <a:blip r:embed="rId3"/>
+          <a:stretch>
+            <a:fillRect/>
+          </a:stretch>
+        </p:blipFill>
+        <p:spPr>
+          <a:xfrm>
+            <a:off x="5872117" y="3698618"/>
+            <a:ext cx="5422900" cy="2882785"/>
+          </a:xfrm>
+        </p:spPr>
+      </p:pic>
+      <p:sp>
+        <p:nvSpPr>
+          <p:cNvPr id="9" name="CuadroTexto 8">
+            <a:extLst>
+              <a:ext uri="{FF2B5EF4-FFF2-40B4-BE49-F238E27FC236}">
+                <a16:creationId xmlns:a16="http://schemas.microsoft.com/office/drawing/2014/main" id="{E5793B08-E014-5FF9-5077-C40E6828E5DE}"/>
+              </a:ext>
+            </a:extLst>
+          </p:cNvPr>
+          <p:cNvSpPr txBox="1"/>
+          <p:nvPr/>
+        </p:nvSpPr>
+        <p:spPr>
+          <a:xfrm>
+            <a:off x="896983" y="2394857"/>
+            <a:ext cx="2603863" cy="3416320"/>
+          </a:xfrm>
+          <a:prstGeom prst="rect">
+            <a:avLst/>
+          </a:prstGeom>
+          <a:noFill/>
+        </p:spPr>
+        <p:txBody>
+          <a:bodyPr wrap="square" rtlCol="0">
+            <a:spAutoFit/>
+          </a:bodyPr>
+          <a:lstStyle/>
+          <a:p>
+            <a:pPr algn="just"/>
+            <a:r>
+              <a:rPr lang="es-ES" dirty="0"/>
+              <a:t>Para la configuración del módulo de Google </a:t>
+            </a:r>
+            <a:r>
+              <a:rPr lang="es-ES" dirty="0" err="1"/>
+              <a:t>Sheets</a:t>
+            </a:r>
+            <a:r>
+              <a:rPr lang="es-ES" dirty="0"/>
+              <a:t>, debemos iniciar sesión con una cuenta de Google y especificar donde se encuentra la hoja de cálculo y que campos queremos guardar de la conversación, tal y como se observa en la siguiente imagen:</a:t>
+            </a:r>
+          </a:p>
+        </p:txBody>
+      </p:sp>
+      <p:sp>
+        <p:nvSpPr>
+          <p:cNvPr id="10" name="CuadroTexto 9">
+            <a:extLst>
+              <a:ext uri="{FF2B5EF4-FFF2-40B4-BE49-F238E27FC236}">
+                <a16:creationId xmlns:a16="http://schemas.microsoft.com/office/drawing/2014/main" id="{711CE2C0-C7CB-D71C-ACCA-93454AB1042B}"/>
+              </a:ext>
+            </a:extLst>
+          </p:cNvPr>
+          <p:cNvSpPr txBox="1"/>
+          <p:nvPr/>
+        </p:nvSpPr>
+        <p:spPr>
+          <a:xfrm>
+            <a:off x="5947954" y="2290354"/>
+            <a:ext cx="5347063" cy="1200329"/>
+          </a:xfrm>
+          <a:prstGeom prst="rect">
+            <a:avLst/>
+          </a:prstGeom>
+          <a:noFill/>
+        </p:spPr>
+        <p:txBody>
+          <a:bodyPr wrap="square" rtlCol="0">
+            <a:spAutoFit/>
+          </a:bodyPr>
+          <a:lstStyle/>
+          <a:p>
+            <a:r>
+              <a:rPr lang="es-ES" dirty="0"/>
+              <a:t>Y una vez todo configurado, si ejecutamos el escenario en el lugar especificado de la hoja de cálculo se mostrarán los resultados de la conversación del chat de </a:t>
+            </a:r>
+            <a:r>
+              <a:rPr lang="es-ES" dirty="0" err="1"/>
+              <a:t>discord</a:t>
+            </a:r>
+            <a:r>
+              <a:rPr lang="es-ES" dirty="0"/>
+              <a:t>, como vemos aquí:</a:t>
+            </a:r>
+          </a:p>
+        </p:txBody>
+      </p:sp>
+    </p:spTree>
+    <p:extLst>
+      <p:ext uri="{BB962C8B-B14F-4D97-AF65-F5344CB8AC3E}">
+        <p14:creationId xmlns:p14="http://schemas.microsoft.com/office/powerpoint/2010/main" val="421170929"/>
+      </p:ext>
+    </p:extLst>
+  </p:cSld>
+  <p:clrMapOvr>
+    <a:masterClrMapping/>
+  </p:clrMapOvr>
+</p:sld>
+</file>
+
 <file path=ppt/slides/slide2.xml><?xml version="1.0" encoding="utf-8"?>
 <p:sld xmlns:a="http://schemas.openxmlformats.org/drawingml/2006/main" xmlns:r="http://schemas.openxmlformats.org/officeDocument/2006/relationships" xmlns:p="http://schemas.openxmlformats.org/presentationml/2006/main">
   <p:cSld>
@@ -7954,6 +8786,20 @@
 <file path=ppt/slides/slide3.xml><?xml version="1.0" encoding="utf-8"?>
 <p:sld xmlns:a="http://schemas.openxmlformats.org/drawingml/2006/main" xmlns:r="http://schemas.openxmlformats.org/officeDocument/2006/relationships" xmlns:p="http://schemas.openxmlformats.org/presentationml/2006/main">
   <p:cSld>
+    <p:bg>
+      <p:bgPr>
+        <a:blipFill dpi="0" rotWithShape="1">
+          <a:blip r:embed="rId2">
+            <a:lum/>
+          </a:blip>
+          <a:srcRect/>
+          <a:stretch>
+            <a:fillRect l="-4000" r="-4000"/>
+          </a:stretch>
+        </a:blipFill>
+        <a:effectLst/>
+      </p:bgPr>
+    </p:bg>
     <p:spTree>
       <p:nvGrpSpPr>
         <p:cNvPr id="1" name=""/>
@@ -7986,7 +8832,7 @@
         </p:nvSpPr>
         <p:spPr>
           <a:xfrm>
-            <a:off x="581192" y="3505304"/>
+            <a:off x="581192" y="4615648"/>
             <a:ext cx="11029615" cy="1497507"/>
           </a:xfrm>
         </p:spPr>
@@ -7995,23 +8841,43 @@
           <a:lstStyle/>
           <a:p>
             <a:r>
-              <a:rPr lang="es-ES" dirty="0"/>
+              <a:rPr lang="es-ES" dirty="0">
+                <a:solidFill>
+                  <a:schemeClr val="bg1"/>
+                </a:solidFill>
+              </a:rPr>
               <a:t>¿Qué es </a:t>
             </a:r>
             <a:r>
-              <a:rPr lang="es-ES" dirty="0" err="1"/>
+              <a:rPr lang="es-ES" dirty="0" err="1">
+                <a:solidFill>
+                  <a:schemeClr val="bg1"/>
+                </a:solidFill>
+              </a:rPr>
               <a:t>integromat</a:t>
             </a:r>
             <a:r>
-              <a:rPr lang="es-ES" dirty="0"/>
+              <a:rPr lang="es-ES" dirty="0">
+                <a:solidFill>
+                  <a:schemeClr val="bg1"/>
+                </a:solidFill>
+              </a:rPr>
               <a:t> </a:t>
             </a:r>
             <a:r>
-              <a:rPr lang="es-ES" dirty="0" err="1"/>
+              <a:rPr lang="es-ES" dirty="0" err="1">
+                <a:solidFill>
+                  <a:schemeClr val="bg1"/>
+                </a:solidFill>
+              </a:rPr>
               <a:t>make</a:t>
             </a:r>
             <a:r>
-              <a:rPr lang="es-ES" dirty="0"/>
+              <a:rPr lang="es-ES" dirty="0">
+                <a:solidFill>
+                  <a:schemeClr val="bg1"/>
+                </a:solidFill>
+              </a:rPr>
               <a:t>?</a:t>
             </a:r>
           </a:p>
@@ -8052,6 +8918,208 @@
           <p:cNvPr id="2" name="Título 1">
             <a:extLst>
               <a:ext uri="{FF2B5EF4-FFF2-40B4-BE49-F238E27FC236}">
+                <a16:creationId xmlns:a16="http://schemas.microsoft.com/office/drawing/2014/main" id="{7BC5E1FB-07B8-03E9-9441-F3FA93D7105A}"/>
+              </a:ext>
+            </a:extLst>
+          </p:cNvPr>
+          <p:cNvSpPr>
+            <a:spLocks noGrp="1"/>
+          </p:cNvSpPr>
+          <p:nvPr>
+            <p:ph type="title"/>
+          </p:nvPr>
+        </p:nvSpPr>
+        <p:spPr/>
+        <p:txBody>
+          <a:bodyPr/>
+          <a:lstStyle/>
+          <a:p>
+            <a:r>
+              <a:rPr lang="es-ES" dirty="0">
+                <a:solidFill>
+                  <a:schemeClr val="bg1"/>
+                </a:solidFill>
+              </a:rPr>
+              <a:t>¿Qué es </a:t>
+            </a:r>
+            <a:r>
+              <a:rPr lang="es-ES" dirty="0" err="1">
+                <a:solidFill>
+                  <a:schemeClr val="bg1"/>
+                </a:solidFill>
+              </a:rPr>
+              <a:t>integromat</a:t>
+            </a:r>
+            <a:r>
+              <a:rPr lang="es-ES" dirty="0">
+                <a:solidFill>
+                  <a:schemeClr val="bg1"/>
+                </a:solidFill>
+              </a:rPr>
+              <a:t> </a:t>
+            </a:r>
+            <a:r>
+              <a:rPr lang="es-ES" dirty="0" err="1">
+                <a:solidFill>
+                  <a:schemeClr val="bg1"/>
+                </a:solidFill>
+              </a:rPr>
+              <a:t>make</a:t>
+            </a:r>
+            <a:r>
+              <a:rPr lang="es-ES" dirty="0">
+                <a:solidFill>
+                  <a:schemeClr val="bg1"/>
+                </a:solidFill>
+              </a:rPr>
+              <a:t>?</a:t>
+            </a:r>
+            <a:endParaRPr lang="es-ES" dirty="0"/>
+          </a:p>
+        </p:txBody>
+      </p:sp>
+      <p:sp>
+        <p:nvSpPr>
+          <p:cNvPr id="3" name="Marcador de contenido 2">
+            <a:extLst>
+              <a:ext uri="{FF2B5EF4-FFF2-40B4-BE49-F238E27FC236}">
+                <a16:creationId xmlns:a16="http://schemas.microsoft.com/office/drawing/2014/main" id="{B112833B-FB1A-DEC3-84CF-18B9E66F3783}"/>
+              </a:ext>
+            </a:extLst>
+          </p:cNvPr>
+          <p:cNvSpPr>
+            <a:spLocks noGrp="1"/>
+          </p:cNvSpPr>
+          <p:nvPr>
+            <p:ph idx="1"/>
+          </p:nvPr>
+        </p:nvSpPr>
+        <p:spPr>
+          <a:xfrm>
+            <a:off x="581192" y="1313721"/>
+            <a:ext cx="11029615" cy="3678303"/>
+          </a:xfrm>
+        </p:spPr>
+        <p:txBody>
+          <a:bodyPr/>
+          <a:lstStyle/>
+          <a:p>
+            <a:pPr algn="just"/>
+            <a:r>
+              <a:rPr lang="es-ES" dirty="0"/>
+              <a:t>Make.com (antes conocido como </a:t>
+            </a:r>
+            <a:r>
+              <a:rPr lang="es-ES" dirty="0" err="1"/>
+              <a:t>Integromat</a:t>
+            </a:r>
+            <a:r>
+              <a:rPr lang="es-ES" dirty="0"/>
+              <a:t>) es una plataforma online de automatización que se define a sí misma como “el pegamento de Internet”. El motivo es que con esta herramienta se pueden conectar gran multitud de aplicaciones entre sí para hacer que funcionen de forma integrada y que puedan trasmitir datos entre ellas.</a:t>
+            </a:r>
+          </a:p>
+          <a:p>
+            <a:pPr algn="just"/>
+            <a:r>
+              <a:rPr lang="es-ES" dirty="0"/>
+              <a:t>Es una herramienta con una gran versatilidad y con infinitud de posibilidades, tantas como al usuario se le ocurra. Para acceder a ella basta con entrar en su web: </a:t>
+            </a:r>
+            <a:r>
+              <a:rPr lang="es-ES" dirty="0">
+                <a:hlinkClick r:id="rId2"/>
+              </a:rPr>
+              <a:t>https://www.make.com/en</a:t>
+            </a:r>
+            <a:r>
+              <a:rPr lang="es-ES" dirty="0"/>
+              <a:t> y crear una cuenta con la que podremos acceder a sus diferentes planes:</a:t>
+            </a:r>
+          </a:p>
+          <a:p>
+            <a:pPr algn="just"/>
+            <a:endParaRPr lang="es-ES" dirty="0"/>
+          </a:p>
+        </p:txBody>
+      </p:sp>
+      <p:pic>
+        <p:nvPicPr>
+          <p:cNvPr id="5" name="Imagen 4">
+            <a:extLst>
+              <a:ext uri="{FF2B5EF4-FFF2-40B4-BE49-F238E27FC236}">
+                <a16:creationId xmlns:a16="http://schemas.microsoft.com/office/drawing/2014/main" id="{AB213CFE-A54B-6FA7-3DB0-991C1E0D7852}"/>
+              </a:ext>
+            </a:extLst>
+          </p:cNvPr>
+          <p:cNvPicPr>
+            <a:picLocks noChangeAspect="1"/>
+          </p:cNvPicPr>
+          <p:nvPr/>
+        </p:nvPicPr>
+        <p:blipFill>
+          <a:blip r:embed="rId3"/>
+          <a:stretch>
+            <a:fillRect/>
+          </a:stretch>
+        </p:blipFill>
+        <p:spPr>
+          <a:xfrm>
+            <a:off x="2924257" y="4169102"/>
+            <a:ext cx="6343483" cy="2450044"/>
+          </a:xfrm>
+          <a:prstGeom prst="rect">
+            <a:avLst/>
+          </a:prstGeom>
+        </p:spPr>
+      </p:pic>
+    </p:spTree>
+    <p:extLst>
+      <p:ext uri="{BB962C8B-B14F-4D97-AF65-F5344CB8AC3E}">
+        <p14:creationId xmlns:p14="http://schemas.microsoft.com/office/powerpoint/2010/main" val="575300646"/>
+      </p:ext>
+    </p:extLst>
+  </p:cSld>
+  <p:clrMapOvr>
+    <a:masterClrMapping/>
+  </p:clrMapOvr>
+</p:sld>
+</file>
+
+<file path=ppt/slides/slide5.xml><?xml version="1.0" encoding="utf-8"?>
+<p:sld xmlns:a="http://schemas.openxmlformats.org/drawingml/2006/main" xmlns:r="http://schemas.openxmlformats.org/officeDocument/2006/relationships" xmlns:p="http://schemas.openxmlformats.org/presentationml/2006/main">
+  <p:cSld>
+    <p:bg>
+      <p:bgPr>
+        <a:blipFill dpi="0" rotWithShape="1">
+          <a:blip r:embed="rId2">
+            <a:lum/>
+          </a:blip>
+          <a:srcRect/>
+          <a:stretch>
+            <a:fillRect l="-4000" r="-4000"/>
+          </a:stretch>
+        </a:blipFill>
+        <a:effectLst/>
+      </p:bgPr>
+    </p:bg>
+    <p:spTree>
+      <p:nvGrpSpPr>
+        <p:cNvPr id="1" name=""/>
+        <p:cNvGrpSpPr/>
+        <p:nvPr/>
+      </p:nvGrpSpPr>
+      <p:grpSpPr>
+        <a:xfrm>
+          <a:off x="0" y="0"/>
+          <a:ext cx="0" cy="0"/>
+          <a:chOff x="0" y="0"/>
+          <a:chExt cx="0" cy="0"/>
+        </a:xfrm>
+      </p:grpSpPr>
+      <p:sp>
+        <p:nvSpPr>
+          <p:cNvPr id="2" name="Título 1">
+            <a:extLst>
+              <a:ext uri="{FF2B5EF4-FFF2-40B4-BE49-F238E27FC236}">
                 <a16:creationId xmlns:a16="http://schemas.microsoft.com/office/drawing/2014/main" id="{6F7F93AD-E727-D8DB-1412-55A5B91A66BE}"/>
               </a:ext>
             </a:extLst>
@@ -8065,7 +9133,7 @@
         </p:nvSpPr>
         <p:spPr>
           <a:xfrm>
-            <a:off x="581192" y="3505304"/>
+            <a:off x="581192" y="4615648"/>
             <a:ext cx="11029615" cy="1497507"/>
           </a:xfrm>
         </p:spPr>
@@ -8073,33 +9141,50 @@
           <a:bodyPr/>
           <a:lstStyle/>
           <a:p>
-            <a:pPr lvl="0">
-              <a:defRPr cap="all"/>
-            </a:pPr>
-            <a:r>
-              <a:rPr lang="es-ES" dirty="0"/>
+            <a:r>
+              <a:rPr lang="es-ES" dirty="0">
+                <a:solidFill>
+                  <a:schemeClr val="bg1"/>
+                </a:solidFill>
+              </a:rPr>
               <a:t>Cómo utilizar </a:t>
             </a:r>
             <a:r>
-              <a:rPr lang="es-ES" dirty="0" err="1"/>
+              <a:rPr lang="es-ES" dirty="0" err="1">
+                <a:solidFill>
+                  <a:schemeClr val="bg1"/>
+                </a:solidFill>
+              </a:rPr>
               <a:t>Integromat</a:t>
             </a:r>
             <a:r>
-              <a:rPr lang="es-ES" dirty="0"/>
+              <a:rPr lang="es-ES" dirty="0">
+                <a:solidFill>
+                  <a:schemeClr val="bg1"/>
+                </a:solidFill>
+              </a:rPr>
               <a:t> </a:t>
             </a:r>
             <a:r>
-              <a:rPr lang="es-ES" dirty="0" err="1"/>
+              <a:rPr lang="es-ES" dirty="0" err="1">
+                <a:solidFill>
+                  <a:schemeClr val="bg1"/>
+                </a:solidFill>
+              </a:rPr>
               <a:t>Make</a:t>
             </a:r>
-            <a:endParaRPr lang="en-US" dirty="0"/>
+            <a:endParaRPr lang="es-ES" dirty="0">
+              <a:solidFill>
+                <a:schemeClr val="bg1"/>
+              </a:solidFill>
+            </a:endParaRPr>
           </a:p>
         </p:txBody>
       </p:sp>
     </p:spTree>
     <p:extLst>
       <p:ext uri="{BB962C8B-B14F-4D97-AF65-F5344CB8AC3E}">
-        <p14:creationId xmlns:p14="http://schemas.microsoft.com/office/powerpoint/2010/main" val="2250516715"/>
+        <p14:creationId xmlns:p14="http://schemas.microsoft.com/office/powerpoint/2010/main" val="3691193038"/>
       </p:ext>
     </p:extLst>
   </p:cSld>
@@ -8109,7 +9194,7 @@
 </p:sld>
 </file>
 
-<file path=ppt/slides/slide5.xml><?xml version="1.0" encoding="utf-8"?>
+<file path=ppt/slides/slide6.xml><?xml version="1.0" encoding="utf-8"?>
 <p:sld xmlns:a="http://schemas.openxmlformats.org/drawingml/2006/main" xmlns:r="http://schemas.openxmlformats.org/officeDocument/2006/relationships" xmlns:p="http://schemas.openxmlformats.org/presentationml/2006/main">
   <p:cSld>
     <p:spTree>
@@ -8128,6 +9213,389 @@
       </p:grpSpPr>
       <p:sp>
         <p:nvSpPr>
+          <p:cNvPr id="4" name="Título 3">
+            <a:extLst>
+              <a:ext uri="{FF2B5EF4-FFF2-40B4-BE49-F238E27FC236}">
+                <a16:creationId xmlns:a16="http://schemas.microsoft.com/office/drawing/2014/main" id="{289A8BB5-85FB-C38B-FEF0-03AAA15E74D1}"/>
+              </a:ext>
+            </a:extLst>
+          </p:cNvPr>
+          <p:cNvSpPr>
+            <a:spLocks noGrp="1"/>
+          </p:cNvSpPr>
+          <p:nvPr>
+            <p:ph type="title"/>
+          </p:nvPr>
+        </p:nvSpPr>
+        <p:spPr>
+          <a:xfrm>
+            <a:off x="581193" y="729658"/>
+            <a:ext cx="11029616" cy="988332"/>
+          </a:xfrm>
+        </p:spPr>
+        <p:txBody>
+          <a:bodyPr anchor="b">
+            <a:normAutofit/>
+          </a:bodyPr>
+          <a:lstStyle/>
+          <a:p>
+            <a:r>
+              <a:rPr lang="es-ES" dirty="0"/>
+              <a:t>Cómo utilizar </a:t>
+            </a:r>
+            <a:r>
+              <a:rPr lang="es-ES" dirty="0" err="1"/>
+              <a:t>integromat</a:t>
+            </a:r>
+            <a:r>
+              <a:rPr lang="es-ES" dirty="0"/>
+              <a:t> </a:t>
+            </a:r>
+            <a:r>
+              <a:rPr lang="es-ES" dirty="0" err="1"/>
+              <a:t>make</a:t>
+            </a:r>
+            <a:endParaRPr lang="es-ES" dirty="0"/>
+          </a:p>
+        </p:txBody>
+      </p:sp>
+      <p:sp>
+        <p:nvSpPr>
+          <p:cNvPr id="5" name="Marcador de contenido 4">
+            <a:extLst>
+              <a:ext uri="{FF2B5EF4-FFF2-40B4-BE49-F238E27FC236}">
+                <a16:creationId xmlns:a16="http://schemas.microsoft.com/office/drawing/2014/main" id="{6281F800-80C3-5602-57D9-F8158AD1AA6A}"/>
+              </a:ext>
+            </a:extLst>
+          </p:cNvPr>
+          <p:cNvSpPr>
+            <a:spLocks noGrp="1"/>
+          </p:cNvSpPr>
+          <p:nvPr>
+            <p:ph sz="half" idx="1"/>
+          </p:nvPr>
+        </p:nvSpPr>
+        <p:spPr>
+          <a:xfrm>
+            <a:off x="581194" y="2228004"/>
+            <a:ext cx="6757084" cy="2361414"/>
+          </a:xfrm>
+        </p:spPr>
+        <p:txBody>
+          <a:bodyPr anchor="ctr">
+            <a:normAutofit/>
+          </a:bodyPr>
+          <a:lstStyle/>
+          <a:p>
+            <a:pPr algn="just"/>
+            <a:r>
+              <a:rPr lang="es-ES" dirty="0"/>
+              <a:t>En primer lugar, la interfaz de </a:t>
+            </a:r>
+            <a:r>
+              <a:rPr lang="es-ES" dirty="0" err="1"/>
+              <a:t>integromat</a:t>
+            </a:r>
+            <a:r>
+              <a:rPr lang="es-ES" dirty="0"/>
+              <a:t> </a:t>
+            </a:r>
+            <a:r>
+              <a:rPr lang="es-ES" dirty="0" err="1"/>
+              <a:t>make</a:t>
+            </a:r>
+            <a:r>
+              <a:rPr lang="es-ES" dirty="0"/>
+              <a:t> nos muestra el siguiente marco de trabajo:</a:t>
+            </a:r>
+          </a:p>
+          <a:p>
+            <a:pPr algn="just"/>
+            <a:r>
+              <a:rPr lang="es-ES" dirty="0"/>
+              <a:t>En ella vemos, un botón de + donde podremos empezar a crear nuestro sistema, eligiendo qué módulos deseamos integrar</a:t>
+            </a:r>
+          </a:p>
+        </p:txBody>
+      </p:sp>
+      <p:pic>
+        <p:nvPicPr>
+          <p:cNvPr id="7" name="Imagen 6" descr="Aplicación&#10;&#10;Descripción generada automáticamente">
+            <a:extLst>
+              <a:ext uri="{FF2B5EF4-FFF2-40B4-BE49-F238E27FC236}">
+                <a16:creationId xmlns:a16="http://schemas.microsoft.com/office/drawing/2014/main" id="{F0D6D488-7DDB-D42D-1FE8-E32CEF3A17DE}"/>
+              </a:ext>
+            </a:extLst>
+          </p:cNvPr>
+          <p:cNvPicPr>
+            <a:picLocks noChangeAspect="1"/>
+          </p:cNvPicPr>
+          <p:nvPr/>
+        </p:nvPicPr>
+        <p:blipFill>
+          <a:blip r:embed="rId2"/>
+          <a:stretch>
+            <a:fillRect/>
+          </a:stretch>
+        </p:blipFill>
+        <p:spPr>
+          <a:xfrm>
+            <a:off x="1915885" y="4062835"/>
+            <a:ext cx="5422392" cy="2724751"/>
+          </a:xfrm>
+          <a:prstGeom prst="rect">
+            <a:avLst/>
+          </a:prstGeom>
+          <a:noFill/>
+        </p:spPr>
+      </p:pic>
+      <p:pic>
+        <p:nvPicPr>
+          <p:cNvPr id="12" name="Imagen 11" descr="Interfaz de usuario gráfica, Aplicación&#10;&#10;Descripción generada automáticamente">
+            <a:extLst>
+              <a:ext uri="{FF2B5EF4-FFF2-40B4-BE49-F238E27FC236}">
+                <a16:creationId xmlns:a16="http://schemas.microsoft.com/office/drawing/2014/main" id="{BA6AE9E2-B285-017C-5934-5657ABF9D822}"/>
+              </a:ext>
+            </a:extLst>
+          </p:cNvPr>
+          <p:cNvPicPr>
+            <a:picLocks noChangeAspect="1"/>
+          </p:cNvPicPr>
+          <p:nvPr/>
+        </p:nvPicPr>
+        <p:blipFill>
+          <a:blip r:embed="rId3"/>
+          <a:stretch>
+            <a:fillRect/>
+          </a:stretch>
+        </p:blipFill>
+        <p:spPr>
+          <a:xfrm>
+            <a:off x="7463248" y="2419543"/>
+            <a:ext cx="4267796" cy="3286584"/>
+          </a:xfrm>
+          <a:prstGeom prst="rect">
+            <a:avLst/>
+          </a:prstGeom>
+        </p:spPr>
+      </p:pic>
+    </p:spTree>
+    <p:extLst>
+      <p:ext uri="{BB962C8B-B14F-4D97-AF65-F5344CB8AC3E}">
+        <p14:creationId xmlns:p14="http://schemas.microsoft.com/office/powerpoint/2010/main" val="2860027314"/>
+      </p:ext>
+    </p:extLst>
+  </p:cSld>
+  <p:clrMapOvr>
+    <a:masterClrMapping/>
+  </p:clrMapOvr>
+</p:sld>
+</file>
+
+<file path=ppt/slides/slide7.xml><?xml version="1.0" encoding="utf-8"?>
+<p:sld xmlns:a="http://schemas.openxmlformats.org/drawingml/2006/main" xmlns:r="http://schemas.openxmlformats.org/officeDocument/2006/relationships" xmlns:p="http://schemas.openxmlformats.org/presentationml/2006/main">
+  <p:cSld>
+    <p:spTree>
+      <p:nvGrpSpPr>
+        <p:cNvPr id="1" name=""/>
+        <p:cNvGrpSpPr/>
+        <p:nvPr/>
+      </p:nvGrpSpPr>
+      <p:grpSpPr>
+        <a:xfrm>
+          <a:off x="0" y="0"/>
+          <a:ext cx="0" cy="0"/>
+          <a:chOff x="0" y="0"/>
+          <a:chExt cx="0" cy="0"/>
+        </a:xfrm>
+      </p:grpSpPr>
+      <p:sp>
+        <p:nvSpPr>
+          <p:cNvPr id="2" name="Título 1">
+            <a:extLst>
+              <a:ext uri="{FF2B5EF4-FFF2-40B4-BE49-F238E27FC236}">
+                <a16:creationId xmlns:a16="http://schemas.microsoft.com/office/drawing/2014/main" id="{3CCFC2F5-BB25-A3B7-BE03-7759DBAA73D6}"/>
+              </a:ext>
+            </a:extLst>
+          </p:cNvPr>
+          <p:cNvSpPr>
+            <a:spLocks noGrp="1"/>
+          </p:cNvSpPr>
+          <p:nvPr>
+            <p:ph type="title"/>
+          </p:nvPr>
+        </p:nvSpPr>
+        <p:spPr/>
+        <p:txBody>
+          <a:bodyPr/>
+          <a:lstStyle/>
+          <a:p>
+            <a:r>
+              <a:rPr lang="es-ES" dirty="0"/>
+              <a:t>Cómo utilizar </a:t>
+            </a:r>
+            <a:r>
+              <a:rPr lang="es-ES" dirty="0" err="1"/>
+              <a:t>integromat</a:t>
+            </a:r>
+            <a:r>
+              <a:rPr lang="es-ES" dirty="0"/>
+              <a:t> </a:t>
+            </a:r>
+            <a:r>
+              <a:rPr lang="es-ES" dirty="0" err="1"/>
+              <a:t>make</a:t>
+            </a:r>
+            <a:endParaRPr lang="es-ES" dirty="0"/>
+          </a:p>
+        </p:txBody>
+      </p:sp>
+      <p:sp>
+        <p:nvSpPr>
+          <p:cNvPr id="3" name="Marcador de contenido 2">
+            <a:extLst>
+              <a:ext uri="{FF2B5EF4-FFF2-40B4-BE49-F238E27FC236}">
+                <a16:creationId xmlns:a16="http://schemas.microsoft.com/office/drawing/2014/main" id="{5F896395-0D5D-77E6-C2FD-34092B5964CE}"/>
+              </a:ext>
+            </a:extLst>
+          </p:cNvPr>
+          <p:cNvSpPr>
+            <a:spLocks noGrp="1"/>
+          </p:cNvSpPr>
+          <p:nvPr>
+            <p:ph sz="half" idx="1"/>
+          </p:nvPr>
+        </p:nvSpPr>
+        <p:spPr>
+          <a:xfrm>
+            <a:off x="581193" y="2228004"/>
+            <a:ext cx="4726672" cy="2022810"/>
+          </a:xfrm>
+        </p:spPr>
+        <p:txBody>
+          <a:bodyPr/>
+          <a:lstStyle/>
+          <a:p>
+            <a:pPr algn="just"/>
+            <a:r>
+              <a:rPr lang="es-ES" dirty="0"/>
+              <a:t>Una vez seleccionados los módulos que queramos, pasaremos a su configuración y conexión, donde especificaremos los valores necesarios para el módulo</a:t>
+            </a:r>
+          </a:p>
+          <a:p>
+            <a:pPr algn="just"/>
+            <a:r>
+              <a:rPr lang="es-ES" dirty="0"/>
+              <a:t>Por último, para ejecutar nuestro escenario, pulsamos el botón de “Run once”</a:t>
+            </a:r>
+          </a:p>
+        </p:txBody>
+      </p:sp>
+      <p:pic>
+        <p:nvPicPr>
+          <p:cNvPr id="6" name="Marcador de contenido 5" descr="Interfaz de usuario gráfica&#10;&#10;Descripción generada automáticamente con confianza baja">
+            <a:extLst>
+              <a:ext uri="{FF2B5EF4-FFF2-40B4-BE49-F238E27FC236}">
+                <a16:creationId xmlns:a16="http://schemas.microsoft.com/office/drawing/2014/main" id="{A0FE362E-EB35-D607-469B-DD1DF03141F8}"/>
+              </a:ext>
+            </a:extLst>
+          </p:cNvPr>
+          <p:cNvPicPr>
+            <a:picLocks noGrp="1" noChangeAspect="1"/>
+          </p:cNvPicPr>
+          <p:nvPr>
+            <p:ph sz="half" idx="2"/>
+          </p:nvPr>
+        </p:nvPicPr>
+        <p:blipFill>
+          <a:blip r:embed="rId2"/>
+          <a:stretch>
+            <a:fillRect/>
+          </a:stretch>
+        </p:blipFill>
+        <p:spPr>
+          <a:xfrm>
+            <a:off x="905592" y="4327840"/>
+            <a:ext cx="4726672" cy="2530160"/>
+          </a:xfrm>
+        </p:spPr>
+      </p:pic>
+      <p:pic>
+        <p:nvPicPr>
+          <p:cNvPr id="8" name="Imagen 7" descr="Imagen que contiene Diagrama&#10;&#10;Descripción generada automáticamente">
+            <a:extLst>
+              <a:ext uri="{FF2B5EF4-FFF2-40B4-BE49-F238E27FC236}">
+                <a16:creationId xmlns:a16="http://schemas.microsoft.com/office/drawing/2014/main" id="{074E93D0-08A1-2ABE-BDB3-7602F35BC3E7}"/>
+              </a:ext>
+            </a:extLst>
+          </p:cNvPr>
+          <p:cNvPicPr>
+            <a:picLocks noChangeAspect="1"/>
+          </p:cNvPicPr>
+          <p:nvPr/>
+        </p:nvPicPr>
+        <p:blipFill>
+          <a:blip r:embed="rId3"/>
+          <a:stretch>
+            <a:fillRect/>
+          </a:stretch>
+        </p:blipFill>
+        <p:spPr>
+          <a:xfrm>
+            <a:off x="5893521" y="2157967"/>
+            <a:ext cx="6153628" cy="4185694"/>
+          </a:xfrm>
+          <a:prstGeom prst="rect">
+            <a:avLst/>
+          </a:prstGeom>
+        </p:spPr>
+      </p:pic>
+    </p:spTree>
+    <p:extLst>
+      <p:ext uri="{BB962C8B-B14F-4D97-AF65-F5344CB8AC3E}">
+        <p14:creationId xmlns:p14="http://schemas.microsoft.com/office/powerpoint/2010/main" val="2665735719"/>
+      </p:ext>
+    </p:extLst>
+  </p:cSld>
+  <p:clrMapOvr>
+    <a:masterClrMapping/>
+  </p:clrMapOvr>
+</p:sld>
+</file>
+
+<file path=ppt/slides/slide8.xml><?xml version="1.0" encoding="utf-8"?>
+<p:sld xmlns:a="http://schemas.openxmlformats.org/drawingml/2006/main" xmlns:r="http://schemas.openxmlformats.org/officeDocument/2006/relationships" xmlns:p="http://schemas.openxmlformats.org/presentationml/2006/main">
+  <p:cSld>
+    <p:bg>
+      <p:bgPr>
+        <a:blipFill dpi="0" rotWithShape="1">
+          <a:blip r:embed="rId2">
+            <a:lum/>
+          </a:blip>
+          <a:srcRect/>
+          <a:stretch>
+            <a:fillRect l="-2000" r="-2000"/>
+          </a:stretch>
+        </a:blipFill>
+        <a:effectLst/>
+      </p:bgPr>
+    </p:bg>
+    <p:spTree>
+      <p:nvGrpSpPr>
+        <p:cNvPr id="1" name=""/>
+        <p:cNvGrpSpPr/>
+        <p:nvPr/>
+      </p:nvGrpSpPr>
+      <p:grpSpPr>
+        <a:xfrm>
+          <a:off x="0" y="0"/>
+          <a:ext cx="0" cy="0"/>
+          <a:chOff x="0" y="0"/>
+          <a:chExt cx="0" cy="0"/>
+        </a:xfrm>
+      </p:grpSpPr>
+      <p:sp>
+        <p:nvSpPr>
           <p:cNvPr id="2" name="Título 1">
             <a:extLst>
               <a:ext uri="{FF2B5EF4-FFF2-40B4-BE49-F238E27FC236}">
@@ -8144,7 +9612,7 @@
         </p:nvSpPr>
         <p:spPr>
           <a:xfrm>
-            <a:off x="581192" y="3505304"/>
+            <a:off x="581192" y="4615648"/>
             <a:ext cx="11029615" cy="1497507"/>
           </a:xfrm>
         </p:spPr>
@@ -8152,33 +9620,360 @@
           <a:bodyPr/>
           <a:lstStyle/>
           <a:p>
-            <a:pPr lvl="0">
-              <a:defRPr cap="all"/>
-            </a:pPr>
-            <a:r>
-              <a:rPr lang="es-ES" dirty="0"/>
+            <a:r>
+              <a:rPr lang="es-ES" dirty="0">
+                <a:solidFill>
+                  <a:schemeClr val="bg1"/>
+                </a:solidFill>
+              </a:rPr>
               <a:t>Ejemplo práctico: </a:t>
             </a:r>
             <a:r>
-              <a:rPr lang="es-ES" dirty="0" err="1"/>
+              <a:rPr lang="es-ES" dirty="0" err="1">
+                <a:solidFill>
+                  <a:schemeClr val="bg1"/>
+                </a:solidFill>
+              </a:rPr>
               <a:t>Discord</a:t>
             </a:r>
             <a:r>
-              <a:rPr lang="es-ES" dirty="0"/>
+              <a:rPr lang="es-ES" dirty="0">
+                <a:solidFill>
+                  <a:schemeClr val="bg1"/>
+                </a:solidFill>
+              </a:rPr>
               <a:t> y Google </a:t>
             </a:r>
             <a:r>
-              <a:rPr lang="es-ES" dirty="0" err="1"/>
+              <a:rPr lang="es-ES" dirty="0" err="1">
+                <a:solidFill>
+                  <a:schemeClr val="bg1"/>
+                </a:solidFill>
+              </a:rPr>
               <a:t>Sheets</a:t>
             </a:r>
-            <a:endParaRPr lang="en-US" dirty="0"/>
+            <a:endParaRPr lang="es-ES" dirty="0">
+              <a:solidFill>
+                <a:schemeClr val="bg1"/>
+              </a:solidFill>
+            </a:endParaRPr>
           </a:p>
         </p:txBody>
       </p:sp>
     </p:spTree>
     <p:extLst>
       <p:ext uri="{BB962C8B-B14F-4D97-AF65-F5344CB8AC3E}">
-        <p14:creationId xmlns:p14="http://schemas.microsoft.com/office/powerpoint/2010/main" val="2822278097"/>
+        <p14:creationId xmlns:p14="http://schemas.microsoft.com/office/powerpoint/2010/main" val="47104017"/>
+      </p:ext>
+    </p:extLst>
+  </p:cSld>
+  <p:clrMapOvr>
+    <a:masterClrMapping/>
+  </p:clrMapOvr>
+</p:sld>
+</file>
+
+<file path=ppt/slides/slide9.xml><?xml version="1.0" encoding="utf-8"?>
+<p:sld xmlns:a="http://schemas.openxmlformats.org/drawingml/2006/main" xmlns:r="http://schemas.openxmlformats.org/officeDocument/2006/relationships" xmlns:p="http://schemas.openxmlformats.org/presentationml/2006/main">
+  <p:cSld>
+    <p:spTree>
+      <p:nvGrpSpPr>
+        <p:cNvPr id="1" name=""/>
+        <p:cNvGrpSpPr/>
+        <p:nvPr/>
+      </p:nvGrpSpPr>
+      <p:grpSpPr>
+        <a:xfrm>
+          <a:off x="0" y="0"/>
+          <a:ext cx="0" cy="0"/>
+          <a:chOff x="0" y="0"/>
+          <a:chExt cx="0" cy="0"/>
+        </a:xfrm>
+      </p:grpSpPr>
+      <p:sp>
+        <p:nvSpPr>
+          <p:cNvPr id="4" name="Título 3">
+            <a:extLst>
+              <a:ext uri="{FF2B5EF4-FFF2-40B4-BE49-F238E27FC236}">
+                <a16:creationId xmlns:a16="http://schemas.microsoft.com/office/drawing/2014/main" id="{BAC982E8-B8C2-3C68-2A1F-AA8FE773EE84}"/>
+              </a:ext>
+            </a:extLst>
+          </p:cNvPr>
+          <p:cNvSpPr>
+            <a:spLocks noGrp="1"/>
+          </p:cNvSpPr>
+          <p:nvPr>
+            <p:ph type="title"/>
+          </p:nvPr>
+        </p:nvSpPr>
+        <p:spPr>
+          <a:xfrm>
+            <a:off x="581193" y="729658"/>
+            <a:ext cx="11029616" cy="988332"/>
+          </a:xfrm>
+        </p:spPr>
+        <p:txBody>
+          <a:bodyPr anchor="b">
+            <a:normAutofit/>
+          </a:bodyPr>
+          <a:lstStyle/>
+          <a:p>
+            <a:r>
+              <a:rPr lang="es-ES" dirty="0"/>
+              <a:t>Ejemplo Práctico: </a:t>
+            </a:r>
+            <a:r>
+              <a:rPr lang="es-ES" dirty="0" err="1"/>
+              <a:t>discord</a:t>
+            </a:r>
+            <a:r>
+              <a:rPr lang="es-ES" dirty="0"/>
+              <a:t> y Google </a:t>
+            </a:r>
+            <a:r>
+              <a:rPr lang="es-ES" dirty="0" err="1"/>
+              <a:t>sheets</a:t>
+            </a:r>
+            <a:endParaRPr lang="es-ES" dirty="0"/>
+          </a:p>
+        </p:txBody>
+      </p:sp>
+      <p:sp>
+        <p:nvSpPr>
+          <p:cNvPr id="12" name="Content Placeholder 2">
+            <a:extLst>
+              <a:ext uri="{FF2B5EF4-FFF2-40B4-BE49-F238E27FC236}">
+                <a16:creationId xmlns:a16="http://schemas.microsoft.com/office/drawing/2014/main" id="{89F45502-CD5C-8DF5-8105-E0371285B61A}"/>
+              </a:ext>
+            </a:extLst>
+          </p:cNvPr>
+          <p:cNvSpPr>
+            <a:spLocks noGrp="1"/>
+          </p:cNvSpPr>
+          <p:nvPr>
+            <p:ph sz="half" idx="1"/>
+          </p:nvPr>
+        </p:nvSpPr>
+        <p:spPr>
+          <a:xfrm>
+            <a:off x="581193" y="2228003"/>
+            <a:ext cx="5422390" cy="3633047"/>
+          </a:xfrm>
+        </p:spPr>
+        <p:txBody>
+          <a:bodyPr/>
+          <a:lstStyle/>
+          <a:p>
+            <a:pPr algn="just"/>
+            <a:r>
+              <a:rPr lang="en-US" dirty="0"/>
+              <a:t>En </a:t>
+            </a:r>
+            <a:r>
+              <a:rPr lang="en-US" dirty="0" err="1"/>
+              <a:t>este</a:t>
+            </a:r>
+            <a:r>
+              <a:rPr lang="en-US" dirty="0"/>
+              <a:t> </a:t>
+            </a:r>
+            <a:r>
+              <a:rPr lang="en-US" dirty="0" err="1"/>
+              <a:t>ejemplo</a:t>
+            </a:r>
+            <a:r>
+              <a:rPr lang="en-US" dirty="0"/>
+              <a:t> </a:t>
+            </a:r>
+            <a:r>
+              <a:rPr lang="en-US" dirty="0" err="1"/>
+              <a:t>práctico</a:t>
+            </a:r>
+            <a:r>
+              <a:rPr lang="en-US" dirty="0"/>
+              <a:t> </a:t>
+            </a:r>
+            <a:r>
+              <a:rPr lang="en-US" dirty="0" err="1"/>
+              <a:t>configuraremos</a:t>
+            </a:r>
+            <a:r>
+              <a:rPr lang="en-US" dirty="0"/>
+              <a:t> un modulo de la </a:t>
+            </a:r>
+            <a:r>
+              <a:rPr lang="en-US" dirty="0" err="1"/>
+              <a:t>aplicación</a:t>
+            </a:r>
+            <a:r>
+              <a:rPr lang="en-US" dirty="0"/>
+              <a:t> de </a:t>
+            </a:r>
+            <a:r>
+              <a:rPr lang="en-US" dirty="0" err="1"/>
+              <a:t>mensajería</a:t>
+            </a:r>
+            <a:r>
+              <a:rPr lang="en-US" dirty="0"/>
+              <a:t> y </a:t>
+            </a:r>
+            <a:r>
+              <a:rPr lang="en-US" dirty="0" err="1"/>
+              <a:t>voz</a:t>
+            </a:r>
+            <a:r>
+              <a:rPr lang="en-US" dirty="0"/>
+              <a:t> Discord para que </a:t>
+            </a:r>
+            <a:r>
+              <a:rPr lang="en-US" dirty="0" err="1"/>
+              <a:t>por</a:t>
+            </a:r>
+            <a:r>
+              <a:rPr lang="en-US" dirty="0"/>
+              <a:t> </a:t>
+            </a:r>
+            <a:r>
+              <a:rPr lang="en-US" dirty="0" err="1"/>
+              <a:t>cada</a:t>
+            </a:r>
+            <a:r>
+              <a:rPr lang="en-US" dirty="0"/>
+              <a:t> </a:t>
+            </a:r>
+            <a:r>
+              <a:rPr lang="en-US" dirty="0" err="1"/>
+              <a:t>mensaje</a:t>
+            </a:r>
+            <a:r>
+              <a:rPr lang="en-US" dirty="0"/>
+              <a:t> de </a:t>
+            </a:r>
+            <a:r>
+              <a:rPr lang="en-US" dirty="0" err="1"/>
+              <a:t>texto</a:t>
+            </a:r>
+            <a:r>
+              <a:rPr lang="en-US" dirty="0"/>
+              <a:t> que se </a:t>
+            </a:r>
+            <a:r>
+              <a:rPr lang="en-US" dirty="0" err="1"/>
+              <a:t>escriba</a:t>
+            </a:r>
+            <a:r>
+              <a:rPr lang="en-US" dirty="0"/>
+              <a:t> </a:t>
+            </a:r>
+            <a:r>
+              <a:rPr lang="en-US" dirty="0" err="1"/>
+              <a:t>en</a:t>
+            </a:r>
+            <a:r>
+              <a:rPr lang="en-US" dirty="0"/>
+              <a:t> un chat de </a:t>
+            </a:r>
+            <a:r>
+              <a:rPr lang="en-US" dirty="0" err="1"/>
+              <a:t>texto</a:t>
+            </a:r>
+            <a:r>
+              <a:rPr lang="en-US" dirty="0"/>
+              <a:t>, se </a:t>
+            </a:r>
+            <a:r>
+              <a:rPr lang="en-US" dirty="0" err="1"/>
+              <a:t>envien</a:t>
+            </a:r>
+            <a:r>
+              <a:rPr lang="en-US" dirty="0"/>
+              <a:t> y se </a:t>
+            </a:r>
+            <a:r>
+              <a:rPr lang="en-US" dirty="0" err="1"/>
+              <a:t>escriban</a:t>
+            </a:r>
+            <a:r>
+              <a:rPr lang="en-US" dirty="0"/>
+              <a:t> </a:t>
+            </a:r>
+            <a:r>
+              <a:rPr lang="en-US" dirty="0" err="1"/>
+              <a:t>dichos</a:t>
+            </a:r>
+            <a:r>
+              <a:rPr lang="en-US" dirty="0"/>
+              <a:t> </a:t>
+            </a:r>
+            <a:r>
+              <a:rPr lang="en-US" dirty="0" err="1"/>
+              <a:t>mensajes</a:t>
+            </a:r>
+            <a:r>
+              <a:rPr lang="en-US" dirty="0"/>
+              <a:t> </a:t>
+            </a:r>
+            <a:r>
+              <a:rPr lang="en-US" dirty="0" err="1"/>
+              <a:t>en</a:t>
+            </a:r>
+            <a:r>
+              <a:rPr lang="en-US" dirty="0"/>
+              <a:t> </a:t>
+            </a:r>
+            <a:r>
+              <a:rPr lang="en-US" dirty="0" err="1"/>
+              <a:t>una</a:t>
+            </a:r>
+            <a:r>
+              <a:rPr lang="en-US" dirty="0"/>
+              <a:t> hoja de </a:t>
+            </a:r>
+            <a:r>
+              <a:rPr lang="en-US" dirty="0" err="1"/>
+              <a:t>cálculo</a:t>
+            </a:r>
+            <a:r>
+              <a:rPr lang="en-US" dirty="0"/>
+              <a:t> de Google Sheets</a:t>
+            </a:r>
+          </a:p>
+        </p:txBody>
+      </p:sp>
+      <p:pic>
+        <p:nvPicPr>
+          <p:cNvPr id="7" name="Marcador de contenido 6">
+            <a:extLst>
+              <a:ext uri="{FF2B5EF4-FFF2-40B4-BE49-F238E27FC236}">
+                <a16:creationId xmlns:a16="http://schemas.microsoft.com/office/drawing/2014/main" id="{23EF4EA1-4ADB-D6DC-9086-2E90C5F154D3}"/>
+              </a:ext>
+            </a:extLst>
+          </p:cNvPr>
+          <p:cNvPicPr>
+            <a:picLocks noGrp="1" noChangeAspect="1"/>
+          </p:cNvPicPr>
+          <p:nvPr>
+            <p:ph sz="half" idx="2"/>
+          </p:nvPr>
+        </p:nvPicPr>
+        <p:blipFill>
+          <a:blip r:embed="rId2"/>
+          <a:stretch>
+            <a:fillRect/>
+          </a:stretch>
+        </p:blipFill>
+        <p:spPr>
+          <a:xfrm>
+            <a:off x="6188417" y="2580481"/>
+            <a:ext cx="5422392" cy="2928091"/>
+          </a:xfrm>
+          <a:noFill/>
+        </p:spPr>
+      </p:pic>
+    </p:spTree>
+    <p:extLst>
+      <p:ext uri="{BB962C8B-B14F-4D97-AF65-F5344CB8AC3E}">
+        <p14:creationId xmlns:p14="http://schemas.microsoft.com/office/powerpoint/2010/main" val="1731759551"/>
       </p:ext>
     </p:extLst>
   </p:cSld>

</xml_diff>